<commit_message>
Updated plots and data
</commit_message>
<xml_diff>
--- a/Presentations/Outline.pptx
+++ b/Presentations/Outline.pptx
@@ -5,7 +5,7 @@
     <p:sldMasterId id="2147483648" r:id="rId1"/>
   </p:sldMasterIdLst>
   <p:notesMasterIdLst>
-    <p:notesMasterId r:id="rId7"/>
+    <p:notesMasterId r:id="rId8"/>
   </p:notesMasterIdLst>
   <p:sldIdLst>
     <p:sldId id="256" r:id="rId2"/>
@@ -13,6 +13,7 @@
     <p:sldId id="324" r:id="rId4"/>
     <p:sldId id="323" r:id="rId5"/>
     <p:sldId id="325" r:id="rId6"/>
+    <p:sldId id="326" r:id="rId7"/>
   </p:sldIdLst>
   <p:sldSz cx="12192000" cy="6858000"/>
   <p:notesSz cx="6858000" cy="9144000"/>
@@ -201,7 +202,7 @@
           <a:p>
             <a:fld id="{76F3EBFB-F853-40CC-8214-5DE17E9B2AB7}" type="datetimeFigureOut">
               <a:rPr lang="zh-CN" altLang="en-US" smtClean="0"/>
-              <a:t>2025/1/8</a:t>
+              <a:t>2025/3/14</a:t>
             </a:fld>
             <a:endParaRPr lang="zh-CN" altLang="en-US"/>
           </a:p>
@@ -1598,7 +1599,7 @@
           <a:p>
             <a:fld id="{1207FD72-616F-4977-B3F0-301FFB04A510}" type="datetimeFigureOut">
               <a:rPr lang="en-US" smtClean="0"/>
-              <a:t>1/8/2025</a:t>
+              <a:t>3/14/2025</a:t>
             </a:fld>
             <a:endParaRPr lang="en-US"/>
           </a:p>
@@ -10125,31 +10126,6 @@
           </a:p>
         </p:txBody>
       </p:sp>
-      <p:sp>
-        <p:nvSpPr>
-          <p:cNvPr id="3" name="Content Placeholder 2">
-            <a:extLst>
-              <a:ext uri="{FF2B5EF4-FFF2-40B4-BE49-F238E27FC236}">
-                <a16:creationId xmlns:a16="http://schemas.microsoft.com/office/drawing/2014/main" id="{4406E98B-7172-7453-D5DC-FB45CE3FF828}"/>
-              </a:ext>
-            </a:extLst>
-          </p:cNvPr>
-          <p:cNvSpPr>
-            <a:spLocks noGrp="1"/>
-          </p:cNvSpPr>
-          <p:nvPr>
-            <p:ph idx="1"/>
-          </p:nvPr>
-        </p:nvSpPr>
-        <p:spPr/>
-        <p:txBody>
-          <a:bodyPr/>
-          <a:lstStyle/>
-          <a:p>
-            <a:endParaRPr lang="en-US"/>
-          </a:p>
-        </p:txBody>
-      </p:sp>
       <p:pic>
         <p:nvPicPr>
           <p:cNvPr id="5" name="Picture 4">
@@ -10172,7 +10148,7 @@
         </p:blipFill>
         <p:spPr>
           <a:xfrm>
-            <a:off x="3972619" y="2505600"/>
+            <a:off x="8169665" y="2988000"/>
             <a:ext cx="3712245" cy="2876740"/>
           </a:xfrm>
           <a:prstGeom prst="rect">
@@ -10202,7 +10178,7 @@
         </p:blipFill>
         <p:spPr>
           <a:xfrm>
-            <a:off x="7764916" y="2574653"/>
+            <a:off x="4039146" y="3059913"/>
             <a:ext cx="3676690" cy="2876741"/>
           </a:xfrm>
           <a:prstGeom prst="rect">
@@ -10210,6 +10186,149 @@
           </a:prstGeom>
         </p:spPr>
       </p:pic>
+      <p:pic>
+        <p:nvPicPr>
+          <p:cNvPr id="6" name="Picture 5">
+            <a:extLst>
+              <a:ext uri="{FF2B5EF4-FFF2-40B4-BE49-F238E27FC236}">
+                <a16:creationId xmlns:a16="http://schemas.microsoft.com/office/drawing/2014/main" id="{BE59EE94-8E62-1444-CF73-671EC565AB77}"/>
+              </a:ext>
+            </a:extLst>
+          </p:cNvPr>
+          <p:cNvPicPr>
+            <a:picLocks noChangeAspect="1"/>
+          </p:cNvPicPr>
+          <p:nvPr/>
+        </p:nvPicPr>
+        <p:blipFill>
+          <a:blip r:embed="rId4"/>
+          <a:stretch>
+            <a:fillRect/>
+          </a:stretch>
+        </p:blipFill>
+        <p:spPr>
+          <a:xfrm>
+            <a:off x="200110" y="3059913"/>
+            <a:ext cx="3684149" cy="2732914"/>
+          </a:xfrm>
+          <a:prstGeom prst="rect">
+            <a:avLst/>
+          </a:prstGeom>
+        </p:spPr>
+      </p:pic>
+      <p:sp>
+        <p:nvSpPr>
+          <p:cNvPr id="8" name="TextBox 7">
+            <a:extLst>
+              <a:ext uri="{FF2B5EF4-FFF2-40B4-BE49-F238E27FC236}">
+                <a16:creationId xmlns:a16="http://schemas.microsoft.com/office/drawing/2014/main" id="{8E5410BC-88AE-87B2-0ADE-7095A1341874}"/>
+              </a:ext>
+            </a:extLst>
+          </p:cNvPr>
+          <p:cNvSpPr txBox="1"/>
+          <p:nvPr/>
+        </p:nvSpPr>
+        <p:spPr>
+          <a:xfrm>
+            <a:off x="1807200" y="2782757"/>
+            <a:ext cx="1814400" cy="369332"/>
+          </a:xfrm>
+          <a:prstGeom prst="rect">
+            <a:avLst/>
+          </a:prstGeom>
+          <a:noFill/>
+        </p:spPr>
+        <p:txBody>
+          <a:bodyPr wrap="square" rtlCol="0">
+            <a:spAutoFit/>
+          </a:bodyPr>
+          <a:lstStyle/>
+          <a:p>
+            <a:r>
+              <a:rPr lang="en-US" dirty="0"/>
+              <a:t>CMT</a:t>
+            </a:r>
+          </a:p>
+        </p:txBody>
+      </p:sp>
+      <p:sp>
+        <p:nvSpPr>
+          <p:cNvPr id="9" name="TextBox 8">
+            <a:extLst>
+              <a:ext uri="{FF2B5EF4-FFF2-40B4-BE49-F238E27FC236}">
+                <a16:creationId xmlns:a16="http://schemas.microsoft.com/office/drawing/2014/main" id="{7315C571-CAF3-EE05-0642-CC6D53F2DFA8}"/>
+              </a:ext>
+            </a:extLst>
+          </p:cNvPr>
+          <p:cNvSpPr txBox="1"/>
+          <p:nvPr/>
+        </p:nvSpPr>
+        <p:spPr>
+          <a:xfrm>
+            <a:off x="4890000" y="2803334"/>
+            <a:ext cx="3116400" cy="369332"/>
+          </a:xfrm>
+          <a:prstGeom prst="rect">
+            <a:avLst/>
+          </a:prstGeom>
+          <a:noFill/>
+        </p:spPr>
+        <p:txBody>
+          <a:bodyPr wrap="square" rtlCol="0">
+            <a:spAutoFit/>
+          </a:bodyPr>
+          <a:lstStyle/>
+          <a:p>
+            <a:r>
+              <a:rPr lang="en-US" dirty="0" err="1"/>
+              <a:t>Ngspice</a:t>
+            </a:r>
+            <a:r>
+              <a:rPr lang="en-US" dirty="0"/>
+              <a:t> without noise</a:t>
+            </a:r>
+          </a:p>
+        </p:txBody>
+      </p:sp>
+      <p:sp>
+        <p:nvSpPr>
+          <p:cNvPr id="10" name="TextBox 9">
+            <a:extLst>
+              <a:ext uri="{FF2B5EF4-FFF2-40B4-BE49-F238E27FC236}">
+                <a16:creationId xmlns:a16="http://schemas.microsoft.com/office/drawing/2014/main" id="{88C8F7E7-9DC5-8287-C8C7-BF41921F063F}"/>
+              </a:ext>
+            </a:extLst>
+          </p:cNvPr>
+          <p:cNvSpPr txBox="1"/>
+          <p:nvPr/>
+        </p:nvSpPr>
+        <p:spPr>
+          <a:xfrm>
+            <a:off x="9075600" y="2782757"/>
+            <a:ext cx="3116400" cy="369332"/>
+          </a:xfrm>
+          <a:prstGeom prst="rect">
+            <a:avLst/>
+          </a:prstGeom>
+          <a:noFill/>
+        </p:spPr>
+        <p:txBody>
+          <a:bodyPr wrap="square" rtlCol="0">
+            <a:spAutoFit/>
+          </a:bodyPr>
+          <a:lstStyle/>
+          <a:p>
+            <a:r>
+              <a:rPr lang="en-US" dirty="0" err="1"/>
+              <a:t>Ngspice</a:t>
+            </a:r>
+            <a:r>
+              <a:rPr lang="en-US" dirty="0"/>
+              <a:t> with noise</a:t>
+            </a:r>
+          </a:p>
+        </p:txBody>
+      </p:sp>
     </p:spTree>
     <p:extLst>
       <p:ext uri="{BB962C8B-B14F-4D97-AF65-F5344CB8AC3E}">
@@ -10270,10 +10389,269 @@
       </p:sp>
       <p:sp>
         <p:nvSpPr>
+          <p:cNvPr id="5" name="TextBox 4">
+            <a:extLst>
+              <a:ext uri="{FF2B5EF4-FFF2-40B4-BE49-F238E27FC236}">
+                <a16:creationId xmlns:a16="http://schemas.microsoft.com/office/drawing/2014/main" id="{57206E7A-1E7C-18B8-0374-01633A28D668}"/>
+              </a:ext>
+            </a:extLst>
+          </p:cNvPr>
+          <p:cNvSpPr txBox="1"/>
+          <p:nvPr/>
+        </p:nvSpPr>
+        <p:spPr>
+          <a:xfrm>
+            <a:off x="1080000" y="2830147"/>
+            <a:ext cx="5068800" cy="369332"/>
+          </a:xfrm>
+          <a:prstGeom prst="rect">
+            <a:avLst/>
+          </a:prstGeom>
+          <a:noFill/>
+        </p:spPr>
+        <p:txBody>
+          <a:bodyPr wrap="square" rtlCol="0">
+            <a:spAutoFit/>
+          </a:bodyPr>
+          <a:lstStyle/>
+          <a:p>
+            <a:r>
+              <a:rPr lang="en-US" dirty="0"/>
+              <a:t>Optimization Comparison</a:t>
+            </a:r>
+          </a:p>
+        </p:txBody>
+      </p:sp>
+      <p:pic>
+        <p:nvPicPr>
+          <p:cNvPr id="7" name="Picture 6">
+            <a:extLst>
+              <a:ext uri="{FF2B5EF4-FFF2-40B4-BE49-F238E27FC236}">
+                <a16:creationId xmlns:a16="http://schemas.microsoft.com/office/drawing/2014/main" id="{5D283B91-86BB-5B49-D3BD-87894D6F06B7}"/>
+              </a:ext>
+            </a:extLst>
+          </p:cNvPr>
+          <p:cNvPicPr>
+            <a:picLocks noChangeAspect="1"/>
+          </p:cNvPicPr>
+          <p:nvPr/>
+        </p:nvPicPr>
+        <p:blipFill>
+          <a:blip r:embed="rId2"/>
+          <a:stretch>
+            <a:fillRect/>
+          </a:stretch>
+        </p:blipFill>
+        <p:spPr>
+          <a:xfrm>
+            <a:off x="8338228" y="3269410"/>
+            <a:ext cx="3532673" cy="2592876"/>
+          </a:xfrm>
+          <a:prstGeom prst="rect">
+            <a:avLst/>
+          </a:prstGeom>
+        </p:spPr>
+      </p:pic>
+      <p:pic>
+        <p:nvPicPr>
+          <p:cNvPr id="9" name="Picture 8">
+            <a:extLst>
+              <a:ext uri="{FF2B5EF4-FFF2-40B4-BE49-F238E27FC236}">
+                <a16:creationId xmlns:a16="http://schemas.microsoft.com/office/drawing/2014/main" id="{27544127-E6A7-1A1A-F829-9144B87333AA}"/>
+              </a:ext>
+            </a:extLst>
+          </p:cNvPr>
+          <p:cNvPicPr>
+            <a:picLocks noChangeAspect="1"/>
+          </p:cNvPicPr>
+          <p:nvPr/>
+        </p:nvPicPr>
+        <p:blipFill>
+          <a:blip r:embed="rId3"/>
+          <a:stretch>
+            <a:fillRect/>
+          </a:stretch>
+        </p:blipFill>
+        <p:spPr>
+          <a:xfrm>
+            <a:off x="4656060" y="3269409"/>
+            <a:ext cx="3450848" cy="2592876"/>
+          </a:xfrm>
+          <a:prstGeom prst="rect">
+            <a:avLst/>
+          </a:prstGeom>
+        </p:spPr>
+      </p:pic>
+      <p:pic>
+        <p:nvPicPr>
+          <p:cNvPr id="6" name="Picture 5">
+            <a:extLst>
+              <a:ext uri="{FF2B5EF4-FFF2-40B4-BE49-F238E27FC236}">
+                <a16:creationId xmlns:a16="http://schemas.microsoft.com/office/drawing/2014/main" id="{EE4DAF82-443F-4F9A-92F8-7BA0294188A1}"/>
+              </a:ext>
+            </a:extLst>
+          </p:cNvPr>
+          <p:cNvPicPr>
+            <a:picLocks noChangeAspect="1"/>
+          </p:cNvPicPr>
+          <p:nvPr/>
+        </p:nvPicPr>
+        <p:blipFill>
+          <a:blip r:embed="rId4"/>
+          <a:stretch>
+            <a:fillRect/>
+          </a:stretch>
+        </p:blipFill>
+        <p:spPr>
+          <a:xfrm>
+            <a:off x="321099" y="3269409"/>
+            <a:ext cx="3824210" cy="2561739"/>
+          </a:xfrm>
+          <a:prstGeom prst="rect">
+            <a:avLst/>
+          </a:prstGeom>
+        </p:spPr>
+      </p:pic>
+      <p:sp>
+        <p:nvSpPr>
+          <p:cNvPr id="8" name="TextBox 7">
+            <a:extLst>
+              <a:ext uri="{FF2B5EF4-FFF2-40B4-BE49-F238E27FC236}">
+                <a16:creationId xmlns:a16="http://schemas.microsoft.com/office/drawing/2014/main" id="{B52927BB-2235-4C3C-57E5-3B6464AA9572}"/>
+              </a:ext>
+            </a:extLst>
+          </p:cNvPr>
+          <p:cNvSpPr txBox="1"/>
+          <p:nvPr/>
+        </p:nvSpPr>
+        <p:spPr>
+          <a:xfrm>
+            <a:off x="5300400" y="2865112"/>
+            <a:ext cx="5068800" cy="369332"/>
+          </a:xfrm>
+          <a:prstGeom prst="rect">
+            <a:avLst/>
+          </a:prstGeom>
+          <a:noFill/>
+        </p:spPr>
+        <p:txBody>
+          <a:bodyPr wrap="square" rtlCol="0">
+            <a:spAutoFit/>
+          </a:bodyPr>
+          <a:lstStyle/>
+          <a:p>
+            <a:r>
+              <a:rPr lang="en-US" dirty="0" err="1"/>
+              <a:t>Ngspice</a:t>
+            </a:r>
+            <a:r>
+              <a:rPr lang="en-US" dirty="0"/>
+              <a:t> (Without noise)</a:t>
+            </a:r>
+          </a:p>
+        </p:txBody>
+      </p:sp>
+      <p:sp>
+        <p:nvSpPr>
+          <p:cNvPr id="10" name="TextBox 9">
+            <a:extLst>
+              <a:ext uri="{FF2B5EF4-FFF2-40B4-BE49-F238E27FC236}">
+                <a16:creationId xmlns:a16="http://schemas.microsoft.com/office/drawing/2014/main" id="{468FE4BD-EC54-92FD-2D04-22B0AE9C7106}"/>
+              </a:ext>
+            </a:extLst>
+          </p:cNvPr>
+          <p:cNvSpPr txBox="1"/>
+          <p:nvPr/>
+        </p:nvSpPr>
+        <p:spPr>
+          <a:xfrm>
+            <a:off x="9938400" y="2871824"/>
+            <a:ext cx="5068800" cy="369332"/>
+          </a:xfrm>
+          <a:prstGeom prst="rect">
+            <a:avLst/>
+          </a:prstGeom>
+          <a:noFill/>
+        </p:spPr>
+        <p:txBody>
+          <a:bodyPr wrap="square" rtlCol="0">
+            <a:spAutoFit/>
+          </a:bodyPr>
+          <a:lstStyle/>
+          <a:p>
+            <a:r>
+              <a:rPr lang="en-US" dirty="0"/>
+              <a:t>CMT</a:t>
+            </a:r>
+          </a:p>
+        </p:txBody>
+      </p:sp>
+    </p:spTree>
+    <p:extLst>
+      <p:ext uri="{BB962C8B-B14F-4D97-AF65-F5344CB8AC3E}">
+        <p14:creationId xmlns:p14="http://schemas.microsoft.com/office/powerpoint/2010/main" val="3944345741"/>
+      </p:ext>
+    </p:extLst>
+  </p:cSld>
+  <p:clrMapOvr>
+    <a:masterClrMapping/>
+  </p:clrMapOvr>
+</p:sld>
+</file>
+
+<file path=ppt/slides/slide6.xml><?xml version="1.0" encoding="utf-8"?>
+<p:sld xmlns:a="http://schemas.openxmlformats.org/drawingml/2006/main" xmlns:r="http://schemas.openxmlformats.org/officeDocument/2006/relationships" xmlns:p="http://schemas.openxmlformats.org/presentationml/2006/main">
+  <p:cSld>
+    <p:spTree>
+      <p:nvGrpSpPr>
+        <p:cNvPr id="1" name=""/>
+        <p:cNvGrpSpPr/>
+        <p:nvPr/>
+      </p:nvGrpSpPr>
+      <p:grpSpPr>
+        <a:xfrm>
+          <a:off x="0" y="0"/>
+          <a:ext cx="0" cy="0"/>
+          <a:chOff x="0" y="0"/>
+          <a:chExt cx="0" cy="0"/>
+        </a:xfrm>
+      </p:grpSpPr>
+      <p:sp>
+        <p:nvSpPr>
+          <p:cNvPr id="2" name="Text Placeholder 1">
+            <a:extLst>
+              <a:ext uri="{FF2B5EF4-FFF2-40B4-BE49-F238E27FC236}">
+                <a16:creationId xmlns:a16="http://schemas.microsoft.com/office/drawing/2014/main" id="{41C47949-B288-3DB0-FFD7-511D9073606B}"/>
+              </a:ext>
+            </a:extLst>
+          </p:cNvPr>
+          <p:cNvSpPr>
+            <a:spLocks noGrp="1"/>
+          </p:cNvSpPr>
+          <p:nvPr>
+            <p:ph type="body" sz="quarter" idx="10"/>
+          </p:nvPr>
+        </p:nvSpPr>
+        <p:spPr/>
+        <p:txBody>
+          <a:bodyPr>
+            <a:normAutofit fontScale="85000" lnSpcReduction="10000"/>
+          </a:bodyPr>
+          <a:lstStyle/>
+          <a:p>
+            <a:r>
+              <a:rPr lang="en-US" dirty="0"/>
+              <a:t>Designing Frequency Combs by Engineered Limit Cycles</a:t>
+            </a:r>
+          </a:p>
+        </p:txBody>
+      </p:sp>
+      <p:sp>
+        <p:nvSpPr>
           <p:cNvPr id="3" name="Content Placeholder 2">
             <a:extLst>
               <a:ext uri="{FF2B5EF4-FFF2-40B4-BE49-F238E27FC236}">
-                <a16:creationId xmlns:a16="http://schemas.microsoft.com/office/drawing/2014/main" id="{AAFC889A-4644-2D05-62C0-F75209A275B2}"/>
+                <a16:creationId xmlns:a16="http://schemas.microsoft.com/office/drawing/2014/main" id="{31D199DC-1C10-C583-5EA5-2B73C527D750}"/>
               </a:ext>
             </a:extLst>
           </p:cNvPr>
@@ -10286,17 +10664,95 @@
         </p:nvSpPr>
         <p:spPr/>
         <p:txBody>
-          <a:bodyPr/>
+          <a:bodyPr>
+            <a:normAutofit/>
+          </a:bodyPr>
           <a:lstStyle/>
           <a:p>
-            <a:endParaRPr lang="en-US"/>
+            <a:pPr marL="514350" indent="-514350">
+              <a:buAutoNum type="arabicPeriod"/>
+            </a:pPr>
+            <a:r>
+              <a:rPr lang="en-US" sz="1800" dirty="0"/>
+              <a:t>Connection between frequency combs and synthetic dimensions/</a:t>
+            </a:r>
+            <a:r>
+              <a:rPr lang="en-US" sz="1800" dirty="0" err="1"/>
+              <a:t>Floquet</a:t>
+            </a:r>
+            <a:r>
+              <a:rPr lang="en-US" sz="1800" dirty="0"/>
+              <a:t> lattices</a:t>
+            </a:r>
+          </a:p>
+          <a:p>
+            <a:pPr marL="514350" indent="-514350">
+              <a:buAutoNum type="arabicPeriod"/>
+            </a:pPr>
+            <a:r>
+              <a:rPr lang="en-US" sz="1800" dirty="0"/>
+              <a:t>The problem with </a:t>
+            </a:r>
+            <a:r>
+              <a:rPr lang="en-US" sz="1800" dirty="0" err="1"/>
+              <a:t>Floquet</a:t>
+            </a:r>
+            <a:r>
+              <a:rPr lang="en-US" sz="1800" dirty="0"/>
+              <a:t> lattices: exponential decay of harmonic</a:t>
+            </a:r>
+          </a:p>
+          <a:p>
+            <a:pPr marL="514350" indent="-514350">
+              <a:buAutoNum type="arabicPeriod"/>
+            </a:pPr>
+            <a:r>
+              <a:rPr lang="en-US" sz="1800" dirty="0"/>
+              <a:t>Traditional alternative methodology for creating frequency combs: utilize nonlinear multimode cavities at steady states (nature photonics paper). Problems with dispersion engineering, excess Q factors, footprint</a:t>
+            </a:r>
+          </a:p>
+          <a:p>
+            <a:pPr marL="514350" indent="-514350">
+              <a:buAutoNum type="arabicPeriod"/>
+            </a:pPr>
+            <a:r>
+              <a:rPr lang="en-US" sz="1800" dirty="0"/>
+              <a:t>Here we propose a totally different approach that simultaneously resolves both problems presented above. Our method relies on shaping a limit cycle emerging from few mode cavities and generate frequency combs with equal footing/balanced profile.</a:t>
+            </a:r>
+          </a:p>
+          <a:p>
+            <a:pPr marL="514350" indent="-514350">
+              <a:buAutoNum type="arabicPeriod"/>
+            </a:pPr>
+            <a:r>
+              <a:rPr lang="en-US" sz="1800" dirty="0"/>
+              <a:t>Discuss coupled mode theory (including physics-driven improvements) for the two dimers. (Quick discussion) (Comparison between 1, 2, and 3 dimers)</a:t>
+            </a:r>
+          </a:p>
+          <a:p>
+            <a:pPr marL="514350" indent="-514350">
+              <a:buAutoNum type="arabicPeriod"/>
+            </a:pPr>
+            <a:r>
+              <a:rPr lang="en-US" sz="1800" dirty="0"/>
+              <a:t>Demonstrate principle for a physical system. a) single dimer b) two dimers. Noise analysis in the appendix.</a:t>
+            </a:r>
+          </a:p>
+          <a:p>
+            <a:pPr marL="514350" indent="-514350">
+              <a:buAutoNum type="arabicPeriod"/>
+            </a:pPr>
+            <a:r>
+              <a:rPr lang="en-US" sz="1800" dirty="0"/>
+              <a:t>Experiment?</a:t>
+            </a:r>
           </a:p>
         </p:txBody>
       </p:sp>
     </p:spTree>
     <p:extLst>
       <p:ext uri="{BB962C8B-B14F-4D97-AF65-F5344CB8AC3E}">
-        <p14:creationId xmlns:p14="http://schemas.microsoft.com/office/powerpoint/2010/main" val="3944345741"/>
+        <p14:creationId xmlns:p14="http://schemas.microsoft.com/office/powerpoint/2010/main" val="2476615575"/>
       </p:ext>
     </p:extLst>
   </p:cSld>

</xml_diff>